<commit_message>
Updated template with bastion host
</commit_message>
<xml_diff>
--- a/doc/Presentation1.pptx
+++ b/doc/Presentation1.pptx
@@ -4,8 +4,12 @@
   <p:sldMasterIdLst>
     <p:sldMasterId id="2147483648" r:id="rId1"/>
   </p:sldMasterIdLst>
+  <p:notesMasterIdLst>
+    <p:notesMasterId r:id="rId4"/>
+  </p:notesMasterIdLst>
   <p:sldIdLst>
     <p:sldId id="256" r:id="rId2"/>
+    <p:sldId id="257" r:id="rId3"/>
   </p:sldIdLst>
   <p:sldSz cx="12192000" cy="6858000"/>
   <p:notesSz cx="6858000" cy="9144000"/>
@@ -104,6 +108,11 @@
       </a:defRPr>
     </a:lvl9pPr>
   </p:defaultTextStyle>
+  <p:extLst>
+    <p:ext uri="{EFAFB233-063F-42B5-8137-9DF3F51BA10A}">
+      <p15:sldGuideLst xmlns:p15="http://schemas.microsoft.com/office/powerpoint/2012/main"/>
+    </p:ext>
+  </p:extLst>
 </p:presentation>
 </file>
 
@@ -1061,6 +1070,13 @@
         </dgm:presLayoutVars>
       </dgm:prSet>
       <dgm:spPr/>
+      <dgm:t>
+        <a:bodyPr/>
+        <a:lstStyle/>
+        <a:p>
+          <a:endParaRPr lang="en-US"/>
+        </a:p>
+      </dgm:t>
     </dgm:pt>
     <dgm:pt modelId="{8B7D12A8-0C48-A04D-A3E9-F5C27E87C9C4}" type="pres">
       <dgm:prSet presAssocID="{6666D314-AEAE-1545-B27B-D9189B5CA56D}" presName="parTxOnly" presStyleLbl="node1" presStyleIdx="0" presStyleCnt="5">
@@ -1069,6 +1085,13 @@
         </dgm:presLayoutVars>
       </dgm:prSet>
       <dgm:spPr/>
+      <dgm:t>
+        <a:bodyPr/>
+        <a:lstStyle/>
+        <a:p>
+          <a:endParaRPr lang="en-US"/>
+        </a:p>
+      </dgm:t>
     </dgm:pt>
     <dgm:pt modelId="{E2130E3C-8497-004E-9068-D8635BFBF13E}" type="pres">
       <dgm:prSet presAssocID="{CC9F6D5C-7B71-014C-BAAD-10EE5694C0D4}" presName="parSpace" presStyleCnt="0"/>
@@ -1081,6 +1104,13 @@
         </dgm:presLayoutVars>
       </dgm:prSet>
       <dgm:spPr/>
+      <dgm:t>
+        <a:bodyPr/>
+        <a:lstStyle/>
+        <a:p>
+          <a:endParaRPr lang="en-US"/>
+        </a:p>
+      </dgm:t>
     </dgm:pt>
     <dgm:pt modelId="{012605D0-F84A-EF46-8CC3-5BF724D07EB9}" type="pres">
       <dgm:prSet presAssocID="{20C003E0-57F8-824D-A251-D738662F3C0C}" presName="parSpace" presStyleCnt="0"/>
@@ -1093,6 +1123,13 @@
         </dgm:presLayoutVars>
       </dgm:prSet>
       <dgm:spPr/>
+      <dgm:t>
+        <a:bodyPr/>
+        <a:lstStyle/>
+        <a:p>
+          <a:endParaRPr lang="en-US"/>
+        </a:p>
+      </dgm:t>
     </dgm:pt>
     <dgm:pt modelId="{F2DABD3D-B281-3746-96ED-52E17F167221}" type="pres">
       <dgm:prSet presAssocID="{8CDD8871-A3EE-F04A-A098-8CBF891857AA}" presName="parSpace" presStyleCnt="0"/>
@@ -1105,6 +1142,13 @@
         </dgm:presLayoutVars>
       </dgm:prSet>
       <dgm:spPr/>
+      <dgm:t>
+        <a:bodyPr/>
+        <a:lstStyle/>
+        <a:p>
+          <a:endParaRPr lang="en-US"/>
+        </a:p>
+      </dgm:t>
     </dgm:pt>
     <dgm:pt modelId="{EADB5655-809F-7744-A748-F125E5567516}" type="pres">
       <dgm:prSet presAssocID="{6B4E943D-99DB-1047-B755-B0DA824FAD7E}" presName="parSpace" presStyleCnt="0"/>
@@ -2971,6 +3015,441 @@
 </dgm:styleDef>
 </file>
 
+<file path=ppt/notesMasters/notesMaster1.xml><?xml version="1.0" encoding="utf-8"?>
+<p:notesMaster xmlns:a="http://schemas.openxmlformats.org/drawingml/2006/main" xmlns:r="http://schemas.openxmlformats.org/officeDocument/2006/relationships" xmlns:p="http://schemas.openxmlformats.org/presentationml/2006/main">
+  <p:cSld>
+    <p:bg>
+      <p:bgRef idx="1001">
+        <a:schemeClr val="bg1"/>
+      </p:bgRef>
+    </p:bg>
+    <p:spTree>
+      <p:nvGrpSpPr>
+        <p:cNvPr id="1" name=""/>
+        <p:cNvGrpSpPr/>
+        <p:nvPr/>
+      </p:nvGrpSpPr>
+      <p:grpSpPr>
+        <a:xfrm>
+          <a:off x="0" y="0"/>
+          <a:ext cx="0" cy="0"/>
+          <a:chOff x="0" y="0"/>
+          <a:chExt cx="0" cy="0"/>
+        </a:xfrm>
+      </p:grpSpPr>
+      <p:sp>
+        <p:nvSpPr>
+          <p:cNvPr id="2" name="Header Placeholder 1"/>
+          <p:cNvSpPr>
+            <a:spLocks noGrp="1"/>
+          </p:cNvSpPr>
+          <p:nvPr>
+            <p:ph type="hdr" sz="quarter"/>
+          </p:nvPr>
+        </p:nvSpPr>
+        <p:spPr>
+          <a:xfrm>
+            <a:off x="0" y="0"/>
+            <a:ext cx="2971800" cy="458788"/>
+          </a:xfrm>
+          <a:prstGeom prst="rect">
+            <a:avLst/>
+          </a:prstGeom>
+        </p:spPr>
+        <p:txBody>
+          <a:bodyPr vert="horz" lIns="91440" tIns="45720" rIns="91440" bIns="45720" rtlCol="0"/>
+          <a:lstStyle>
+            <a:lvl1pPr algn="l">
+              <a:defRPr sz="1200"/>
+            </a:lvl1pPr>
+          </a:lstStyle>
+          <a:p>
+            <a:endParaRPr lang="en-US"/>
+          </a:p>
+        </p:txBody>
+      </p:sp>
+      <p:sp>
+        <p:nvSpPr>
+          <p:cNvPr id="3" name="Date Placeholder 2"/>
+          <p:cNvSpPr>
+            <a:spLocks noGrp="1"/>
+          </p:cNvSpPr>
+          <p:nvPr>
+            <p:ph type="dt" idx="1"/>
+          </p:nvPr>
+        </p:nvSpPr>
+        <p:spPr>
+          <a:xfrm>
+            <a:off x="3884613" y="0"/>
+            <a:ext cx="2971800" cy="458788"/>
+          </a:xfrm>
+          <a:prstGeom prst="rect">
+            <a:avLst/>
+          </a:prstGeom>
+        </p:spPr>
+        <p:txBody>
+          <a:bodyPr vert="horz" lIns="91440" tIns="45720" rIns="91440" bIns="45720" rtlCol="0"/>
+          <a:lstStyle>
+            <a:lvl1pPr algn="r">
+              <a:defRPr sz="1200"/>
+            </a:lvl1pPr>
+          </a:lstStyle>
+          <a:p>
+            <a:fld id="{23D6DB96-4DD0-A340-8AEE-1EF869E4EC11}" type="datetimeFigureOut">
+              <a:rPr lang="en-US" smtClean="0"/>
+              <a:t>8/15/16</a:t>
+            </a:fld>
+            <a:endParaRPr lang="en-US"/>
+          </a:p>
+        </p:txBody>
+      </p:sp>
+      <p:sp>
+        <p:nvSpPr>
+          <p:cNvPr id="4" name="Slide Image Placeholder 3"/>
+          <p:cNvSpPr>
+            <a:spLocks noGrp="1" noRot="1" noChangeAspect="1"/>
+          </p:cNvSpPr>
+          <p:nvPr>
+            <p:ph type="sldImg" idx="2"/>
+          </p:nvPr>
+        </p:nvSpPr>
+        <p:spPr>
+          <a:xfrm>
+            <a:off x="685800" y="1143000"/>
+            <a:ext cx="5486400" cy="3086100"/>
+          </a:xfrm>
+          <a:prstGeom prst="rect">
+            <a:avLst/>
+          </a:prstGeom>
+          <a:noFill/>
+          <a:ln w="12700">
+            <a:solidFill>
+              <a:prstClr val="black"/>
+            </a:solidFill>
+          </a:ln>
+        </p:spPr>
+        <p:txBody>
+          <a:bodyPr vert="horz" lIns="91440" tIns="45720" rIns="91440" bIns="45720" rtlCol="0" anchor="ctr"/>
+          <a:lstStyle/>
+          <a:p>
+            <a:endParaRPr lang="en-US"/>
+          </a:p>
+        </p:txBody>
+      </p:sp>
+      <p:sp>
+        <p:nvSpPr>
+          <p:cNvPr id="5" name="Notes Placeholder 4"/>
+          <p:cNvSpPr>
+            <a:spLocks noGrp="1"/>
+          </p:cNvSpPr>
+          <p:nvPr>
+            <p:ph type="body" sz="quarter" idx="3"/>
+          </p:nvPr>
+        </p:nvSpPr>
+        <p:spPr>
+          <a:xfrm>
+            <a:off x="685800" y="4400550"/>
+            <a:ext cx="5486400" cy="3600450"/>
+          </a:xfrm>
+          <a:prstGeom prst="rect">
+            <a:avLst/>
+          </a:prstGeom>
+        </p:spPr>
+        <p:txBody>
+          <a:bodyPr vert="horz" lIns="91440" tIns="45720" rIns="91440" bIns="45720" rtlCol="0"/>
+          <a:lstStyle/>
+          <a:p>
+            <a:pPr lvl="0"/>
+            <a:r>
+              <a:rPr lang="en-US" smtClean="0"/>
+              <a:t>Click to edit Master text styles</a:t>
+            </a:r>
+          </a:p>
+          <a:p>
+            <a:pPr lvl="1"/>
+            <a:r>
+              <a:rPr lang="en-US" smtClean="0"/>
+              <a:t>Second level</a:t>
+            </a:r>
+          </a:p>
+          <a:p>
+            <a:pPr lvl="2"/>
+            <a:r>
+              <a:rPr lang="en-US" smtClean="0"/>
+              <a:t>Third level</a:t>
+            </a:r>
+          </a:p>
+          <a:p>
+            <a:pPr lvl="3"/>
+            <a:r>
+              <a:rPr lang="en-US" smtClean="0"/>
+              <a:t>Fourth level</a:t>
+            </a:r>
+          </a:p>
+          <a:p>
+            <a:pPr lvl="4"/>
+            <a:r>
+              <a:rPr lang="en-US" smtClean="0"/>
+              <a:t>Fifth level</a:t>
+            </a:r>
+            <a:endParaRPr lang="en-US"/>
+          </a:p>
+        </p:txBody>
+      </p:sp>
+      <p:sp>
+        <p:nvSpPr>
+          <p:cNvPr id="6" name="Footer Placeholder 5"/>
+          <p:cNvSpPr>
+            <a:spLocks noGrp="1"/>
+          </p:cNvSpPr>
+          <p:nvPr>
+            <p:ph type="ftr" sz="quarter" idx="4"/>
+          </p:nvPr>
+        </p:nvSpPr>
+        <p:spPr>
+          <a:xfrm>
+            <a:off x="0" y="8685213"/>
+            <a:ext cx="2971800" cy="458787"/>
+          </a:xfrm>
+          <a:prstGeom prst="rect">
+            <a:avLst/>
+          </a:prstGeom>
+        </p:spPr>
+        <p:txBody>
+          <a:bodyPr vert="horz" lIns="91440" tIns="45720" rIns="91440" bIns="45720" rtlCol="0" anchor="b"/>
+          <a:lstStyle>
+            <a:lvl1pPr algn="l">
+              <a:defRPr sz="1200"/>
+            </a:lvl1pPr>
+          </a:lstStyle>
+          <a:p>
+            <a:endParaRPr lang="en-US"/>
+          </a:p>
+        </p:txBody>
+      </p:sp>
+      <p:sp>
+        <p:nvSpPr>
+          <p:cNvPr id="7" name="Slide Number Placeholder 6"/>
+          <p:cNvSpPr>
+            <a:spLocks noGrp="1"/>
+          </p:cNvSpPr>
+          <p:nvPr>
+            <p:ph type="sldNum" sz="quarter" idx="5"/>
+          </p:nvPr>
+        </p:nvSpPr>
+        <p:spPr>
+          <a:xfrm>
+            <a:off x="3884613" y="8685213"/>
+            <a:ext cx="2971800" cy="458787"/>
+          </a:xfrm>
+          <a:prstGeom prst="rect">
+            <a:avLst/>
+          </a:prstGeom>
+        </p:spPr>
+        <p:txBody>
+          <a:bodyPr vert="horz" lIns="91440" tIns="45720" rIns="91440" bIns="45720" rtlCol="0" anchor="b"/>
+          <a:lstStyle>
+            <a:lvl1pPr algn="r">
+              <a:defRPr sz="1200"/>
+            </a:lvl1pPr>
+          </a:lstStyle>
+          <a:p>
+            <a:fld id="{A6B6EF46-B2F1-3442-9D47-4621FB055453}" type="slidenum">
+              <a:rPr lang="en-US" smtClean="0"/>
+              <a:t>‹#›</a:t>
+            </a:fld>
+            <a:endParaRPr lang="en-US"/>
+          </a:p>
+        </p:txBody>
+      </p:sp>
+    </p:spTree>
+    <p:extLst>
+      <p:ext uri="{BB962C8B-B14F-4D97-AF65-F5344CB8AC3E}">
+        <p14:creationId xmlns:p14="http://schemas.microsoft.com/office/powerpoint/2010/main" val="1786694306"/>
+      </p:ext>
+    </p:extLst>
+  </p:cSld>
+  <p:clrMap bg1="lt1" tx1="dk1" bg2="lt2" tx2="dk2" accent1="accent1" accent2="accent2" accent3="accent3" accent4="accent4" accent5="accent5" accent6="accent6" hlink="hlink" folHlink="folHlink"/>
+  <p:notesStyle>
+    <a:lvl1pPr marL="0" algn="l" defTabSz="914400" rtl="0" eaLnBrk="1" latinLnBrk="0" hangingPunct="1">
+      <a:defRPr sz="1200" kern="1200">
+        <a:solidFill>
+          <a:schemeClr val="tx1"/>
+        </a:solidFill>
+        <a:latin typeface="+mn-lt"/>
+        <a:ea typeface="+mn-ea"/>
+        <a:cs typeface="+mn-cs"/>
+      </a:defRPr>
+    </a:lvl1pPr>
+    <a:lvl2pPr marL="457200" algn="l" defTabSz="914400" rtl="0" eaLnBrk="1" latinLnBrk="0" hangingPunct="1">
+      <a:defRPr sz="1200" kern="1200">
+        <a:solidFill>
+          <a:schemeClr val="tx1"/>
+        </a:solidFill>
+        <a:latin typeface="+mn-lt"/>
+        <a:ea typeface="+mn-ea"/>
+        <a:cs typeface="+mn-cs"/>
+      </a:defRPr>
+    </a:lvl2pPr>
+    <a:lvl3pPr marL="914400" algn="l" defTabSz="914400" rtl="0" eaLnBrk="1" latinLnBrk="0" hangingPunct="1">
+      <a:defRPr sz="1200" kern="1200">
+        <a:solidFill>
+          <a:schemeClr val="tx1"/>
+        </a:solidFill>
+        <a:latin typeface="+mn-lt"/>
+        <a:ea typeface="+mn-ea"/>
+        <a:cs typeface="+mn-cs"/>
+      </a:defRPr>
+    </a:lvl3pPr>
+    <a:lvl4pPr marL="1371600" algn="l" defTabSz="914400" rtl="0" eaLnBrk="1" latinLnBrk="0" hangingPunct="1">
+      <a:defRPr sz="1200" kern="1200">
+        <a:solidFill>
+          <a:schemeClr val="tx1"/>
+        </a:solidFill>
+        <a:latin typeface="+mn-lt"/>
+        <a:ea typeface="+mn-ea"/>
+        <a:cs typeface="+mn-cs"/>
+      </a:defRPr>
+    </a:lvl4pPr>
+    <a:lvl5pPr marL="1828800" algn="l" defTabSz="914400" rtl="0" eaLnBrk="1" latinLnBrk="0" hangingPunct="1">
+      <a:defRPr sz="1200" kern="1200">
+        <a:solidFill>
+          <a:schemeClr val="tx1"/>
+        </a:solidFill>
+        <a:latin typeface="+mn-lt"/>
+        <a:ea typeface="+mn-ea"/>
+        <a:cs typeface="+mn-cs"/>
+      </a:defRPr>
+    </a:lvl5pPr>
+    <a:lvl6pPr marL="2286000" algn="l" defTabSz="914400" rtl="0" eaLnBrk="1" latinLnBrk="0" hangingPunct="1">
+      <a:defRPr sz="1200" kern="1200">
+        <a:solidFill>
+          <a:schemeClr val="tx1"/>
+        </a:solidFill>
+        <a:latin typeface="+mn-lt"/>
+        <a:ea typeface="+mn-ea"/>
+        <a:cs typeface="+mn-cs"/>
+      </a:defRPr>
+    </a:lvl6pPr>
+    <a:lvl7pPr marL="2743200" algn="l" defTabSz="914400" rtl="0" eaLnBrk="1" latinLnBrk="0" hangingPunct="1">
+      <a:defRPr sz="1200" kern="1200">
+        <a:solidFill>
+          <a:schemeClr val="tx1"/>
+        </a:solidFill>
+        <a:latin typeface="+mn-lt"/>
+        <a:ea typeface="+mn-ea"/>
+        <a:cs typeface="+mn-cs"/>
+      </a:defRPr>
+    </a:lvl7pPr>
+    <a:lvl8pPr marL="3200400" algn="l" defTabSz="914400" rtl="0" eaLnBrk="1" latinLnBrk="0" hangingPunct="1">
+      <a:defRPr sz="1200" kern="1200">
+        <a:solidFill>
+          <a:schemeClr val="tx1"/>
+        </a:solidFill>
+        <a:latin typeface="+mn-lt"/>
+        <a:ea typeface="+mn-ea"/>
+        <a:cs typeface="+mn-cs"/>
+      </a:defRPr>
+    </a:lvl8pPr>
+    <a:lvl9pPr marL="3657600" algn="l" defTabSz="914400" rtl="0" eaLnBrk="1" latinLnBrk="0" hangingPunct="1">
+      <a:defRPr sz="1200" kern="1200">
+        <a:solidFill>
+          <a:schemeClr val="tx1"/>
+        </a:solidFill>
+        <a:latin typeface="+mn-lt"/>
+        <a:ea typeface="+mn-ea"/>
+        <a:cs typeface="+mn-cs"/>
+      </a:defRPr>
+    </a:lvl9pPr>
+  </p:notesStyle>
+</p:notesMaster>
+</file>
+
+<file path=ppt/notesSlides/notesSlide1.xml><?xml version="1.0" encoding="utf-8"?>
+<p:notes xmlns:a="http://schemas.openxmlformats.org/drawingml/2006/main" xmlns:r="http://schemas.openxmlformats.org/officeDocument/2006/relationships" xmlns:p="http://schemas.openxmlformats.org/presentationml/2006/main">
+  <p:cSld>
+    <p:spTree>
+      <p:nvGrpSpPr>
+        <p:cNvPr id="1" name=""/>
+        <p:cNvGrpSpPr/>
+        <p:nvPr/>
+      </p:nvGrpSpPr>
+      <p:grpSpPr>
+        <a:xfrm>
+          <a:off x="0" y="0"/>
+          <a:ext cx="0" cy="0"/>
+          <a:chOff x="0" y="0"/>
+          <a:chExt cx="0" cy="0"/>
+        </a:xfrm>
+      </p:grpSpPr>
+      <p:sp>
+        <p:nvSpPr>
+          <p:cNvPr id="2" name="Slide Image Placeholder 1"/>
+          <p:cNvSpPr>
+            <a:spLocks noGrp="1" noRot="1" noChangeAspect="1"/>
+          </p:cNvSpPr>
+          <p:nvPr>
+            <p:ph type="sldImg"/>
+          </p:nvPr>
+        </p:nvSpPr>
+        <p:spPr/>
+      </p:sp>
+      <p:sp>
+        <p:nvSpPr>
+          <p:cNvPr id="3" name="Notes Placeholder 2"/>
+          <p:cNvSpPr>
+            <a:spLocks noGrp="1"/>
+          </p:cNvSpPr>
+          <p:nvPr>
+            <p:ph type="body" idx="1"/>
+          </p:nvPr>
+        </p:nvSpPr>
+        <p:spPr/>
+        <p:txBody>
+          <a:bodyPr/>
+          <a:lstStyle/>
+          <a:p>
+            <a:endParaRPr lang="en-US" dirty="0"/>
+          </a:p>
+        </p:txBody>
+      </p:sp>
+      <p:sp>
+        <p:nvSpPr>
+          <p:cNvPr id="4" name="Slide Number Placeholder 3"/>
+          <p:cNvSpPr>
+            <a:spLocks noGrp="1"/>
+          </p:cNvSpPr>
+          <p:nvPr>
+            <p:ph type="sldNum" sz="quarter" idx="10"/>
+          </p:nvPr>
+        </p:nvSpPr>
+        <p:spPr/>
+        <p:txBody>
+          <a:bodyPr/>
+          <a:lstStyle/>
+          <a:p>
+            <a:fld id="{69C3F2ED-74C5-7D4F-8560-0CC253E9A436}" type="slidenum">
+              <a:rPr lang="en-US" smtClean="0"/>
+              <a:pPr/>
+              <a:t>2</a:t>
+            </a:fld>
+            <a:endParaRPr lang="en-US" dirty="0"/>
+          </a:p>
+        </p:txBody>
+      </p:sp>
+    </p:spTree>
+    <p:extLst>
+      <p:ext uri="{BB962C8B-B14F-4D97-AF65-F5344CB8AC3E}">
+        <p14:creationId xmlns:p14="http://schemas.microsoft.com/office/powerpoint/2010/main" val="213093595"/>
+      </p:ext>
+    </p:extLst>
+  </p:cSld>
+  <p:clrMapOvr>
+    <a:masterClrMapping/>
+  </p:clrMapOvr>
+</p:notes>
+</file>
+
 <file path=ppt/slideLayouts/slideLayout1.xml><?xml version="1.0" encoding="utf-8"?>
 <p:sldLayout xmlns:a="http://schemas.openxmlformats.org/drawingml/2006/main" xmlns:r="http://schemas.openxmlformats.org/officeDocument/2006/relationships" xmlns:p="http://schemas.openxmlformats.org/presentationml/2006/main" type="title" preserve="1">
   <p:cSld name="Title Slide">
@@ -3102,7 +3581,7 @@
           <a:p>
             <a:fld id="{7BAD783E-C843-704F-BAA0-2F19FC20D646}" type="datetimeFigureOut">
               <a:rPr lang="en-US" smtClean="0"/>
-              <a:t>6/15/16</a:t>
+              <a:t>8/12/16</a:t>
             </a:fld>
             <a:endParaRPr lang="en-US"/>
           </a:p>
@@ -3272,7 +3751,7 @@
           <a:p>
             <a:fld id="{7BAD783E-C843-704F-BAA0-2F19FC20D646}" type="datetimeFigureOut">
               <a:rPr lang="en-US" smtClean="0"/>
-              <a:t>6/15/16</a:t>
+              <a:t>8/12/16</a:t>
             </a:fld>
             <a:endParaRPr lang="en-US"/>
           </a:p>
@@ -3452,7 +3931,7 @@
           <a:p>
             <a:fld id="{7BAD783E-C843-704F-BAA0-2F19FC20D646}" type="datetimeFigureOut">
               <a:rPr lang="en-US" smtClean="0"/>
-              <a:t>6/15/16</a:t>
+              <a:t>8/12/16</a:t>
             </a:fld>
             <a:endParaRPr lang="en-US"/>
           </a:p>
@@ -3622,7 +4101,7 @@
           <a:p>
             <a:fld id="{7BAD783E-C843-704F-BAA0-2F19FC20D646}" type="datetimeFigureOut">
               <a:rPr lang="en-US" smtClean="0"/>
-              <a:t>6/15/16</a:t>
+              <a:t>8/12/16</a:t>
             </a:fld>
             <a:endParaRPr lang="en-US"/>
           </a:p>
@@ -3868,7 +4347,7 @@
           <a:p>
             <a:fld id="{7BAD783E-C843-704F-BAA0-2F19FC20D646}" type="datetimeFigureOut">
               <a:rPr lang="en-US" smtClean="0"/>
-              <a:t>6/15/16</a:t>
+              <a:t>8/12/16</a:t>
             </a:fld>
             <a:endParaRPr lang="en-US"/>
           </a:p>
@@ -4100,7 +4579,7 @@
           <a:p>
             <a:fld id="{7BAD783E-C843-704F-BAA0-2F19FC20D646}" type="datetimeFigureOut">
               <a:rPr lang="en-US" smtClean="0"/>
-              <a:t>6/15/16</a:t>
+              <a:t>8/12/16</a:t>
             </a:fld>
             <a:endParaRPr lang="en-US"/>
           </a:p>
@@ -4467,7 +4946,7 @@
           <a:p>
             <a:fld id="{7BAD783E-C843-704F-BAA0-2F19FC20D646}" type="datetimeFigureOut">
               <a:rPr lang="en-US" smtClean="0"/>
-              <a:t>6/15/16</a:t>
+              <a:t>8/12/16</a:t>
             </a:fld>
             <a:endParaRPr lang="en-US"/>
           </a:p>
@@ -4585,7 +5064,7 @@
           <a:p>
             <a:fld id="{7BAD783E-C843-704F-BAA0-2F19FC20D646}" type="datetimeFigureOut">
               <a:rPr lang="en-US" smtClean="0"/>
-              <a:t>6/15/16</a:t>
+              <a:t>8/12/16</a:t>
             </a:fld>
             <a:endParaRPr lang="en-US"/>
           </a:p>
@@ -4680,7 +5159,7 @@
           <a:p>
             <a:fld id="{7BAD783E-C843-704F-BAA0-2F19FC20D646}" type="datetimeFigureOut">
               <a:rPr lang="en-US" smtClean="0"/>
-              <a:t>6/15/16</a:t>
+              <a:t>8/12/16</a:t>
             </a:fld>
             <a:endParaRPr lang="en-US"/>
           </a:p>
@@ -4957,7 +5436,7 @@
           <a:p>
             <a:fld id="{7BAD783E-C843-704F-BAA0-2F19FC20D646}" type="datetimeFigureOut">
               <a:rPr lang="en-US" smtClean="0"/>
-              <a:t>6/15/16</a:t>
+              <a:t>8/12/16</a:t>
             </a:fld>
             <a:endParaRPr lang="en-US"/>
           </a:p>
@@ -5210,7 +5689,7 @@
           <a:p>
             <a:fld id="{7BAD783E-C843-704F-BAA0-2F19FC20D646}" type="datetimeFigureOut">
               <a:rPr lang="en-US" smtClean="0"/>
-              <a:t>6/15/16</a:t>
+              <a:t>8/12/16</a:t>
             </a:fld>
             <a:endParaRPr lang="en-US"/>
           </a:p>
@@ -5423,7 +5902,7 @@
           <a:p>
             <a:fld id="{7BAD783E-C843-704F-BAA0-2F19FC20D646}" type="datetimeFigureOut">
               <a:rPr lang="en-US" smtClean="0"/>
-              <a:t>6/15/16</a:t>
+              <a:t>8/12/16</a:t>
             </a:fld>
             <a:endParaRPr lang="en-US"/>
           </a:p>
@@ -6066,6 +6545,860 @@
 </p:sld>
 </file>
 
+<file path=ppt/slides/slide2.xml><?xml version="1.0" encoding="utf-8"?>
+<p:sld xmlns:a="http://schemas.openxmlformats.org/drawingml/2006/main" xmlns:r="http://schemas.openxmlformats.org/officeDocument/2006/relationships" xmlns:p="http://schemas.openxmlformats.org/presentationml/2006/main">
+  <p:cSld>
+    <p:spTree>
+      <p:nvGrpSpPr>
+        <p:cNvPr id="1" name=""/>
+        <p:cNvGrpSpPr/>
+        <p:nvPr/>
+      </p:nvGrpSpPr>
+      <p:grpSpPr>
+        <a:xfrm>
+          <a:off x="0" y="0"/>
+          <a:ext cx="0" cy="0"/>
+          <a:chOff x="0" y="0"/>
+          <a:chExt cx="0" cy="0"/>
+        </a:xfrm>
+      </p:grpSpPr>
+      <p:sp>
+        <p:nvSpPr>
+          <p:cNvPr id="2" name="Rounded Rectangle 1"/>
+          <p:cNvSpPr/>
+          <p:nvPr/>
+        </p:nvSpPr>
+        <p:spPr>
+          <a:xfrm>
+            <a:off x="3416300" y="1667810"/>
+            <a:ext cx="5669245" cy="5046141"/>
+          </a:xfrm>
+          <a:prstGeom prst="roundRect">
+            <a:avLst>
+              <a:gd name="adj" fmla="val 9818"/>
+            </a:avLst>
+          </a:prstGeom>
+          <a:noFill/>
+          <a:ln w="6350">
+            <a:solidFill>
+              <a:schemeClr val="tx1"/>
+            </a:solidFill>
+            <a:prstDash val="solid"/>
+          </a:ln>
+          <a:effectLst/>
+        </p:spPr>
+        <p:style>
+          <a:lnRef idx="1">
+            <a:schemeClr val="accent1"/>
+          </a:lnRef>
+          <a:fillRef idx="3">
+            <a:schemeClr val="accent1"/>
+          </a:fillRef>
+          <a:effectRef idx="2">
+            <a:schemeClr val="accent1"/>
+          </a:effectRef>
+          <a:fontRef idx="minor">
+            <a:schemeClr val="lt1"/>
+          </a:fontRef>
+        </p:style>
+        <p:txBody>
+          <a:bodyPr anchor="ctr"/>
+          <a:lstStyle/>
+          <a:p>
+            <a:pPr algn="ctr">
+              <a:defRPr/>
+            </a:pPr>
+            <a:endParaRPr lang="en-US" sz="2400" dirty="0">
+              <a:solidFill>
+                <a:schemeClr val="tx1"/>
+              </a:solidFill>
+              <a:latin typeface="Arial"/>
+              <a:cs typeface="Arial"/>
+            </a:endParaRPr>
+          </a:p>
+        </p:txBody>
+      </p:sp>
+      <p:sp>
+        <p:nvSpPr>
+          <p:cNvPr id="3" name="Rounded Rectangle 2"/>
+          <p:cNvSpPr/>
+          <p:nvPr/>
+        </p:nvSpPr>
+        <p:spPr>
+          <a:xfrm>
+            <a:off x="3797677" y="2352566"/>
+            <a:ext cx="5003944" cy="3877045"/>
+          </a:xfrm>
+          <a:prstGeom prst="roundRect">
+            <a:avLst>
+              <a:gd name="adj" fmla="val 9818"/>
+            </a:avLst>
+          </a:prstGeom>
+          <a:noFill/>
+          <a:ln w="6350">
+            <a:solidFill>
+              <a:schemeClr val="tx1"/>
+            </a:solidFill>
+            <a:prstDash val="solid"/>
+          </a:ln>
+          <a:effectLst/>
+        </p:spPr>
+        <p:style>
+          <a:lnRef idx="1">
+            <a:schemeClr val="accent1"/>
+          </a:lnRef>
+          <a:fillRef idx="3">
+            <a:schemeClr val="accent1"/>
+          </a:fillRef>
+          <a:effectRef idx="2">
+            <a:schemeClr val="accent1"/>
+          </a:effectRef>
+          <a:fontRef idx="minor">
+            <a:schemeClr val="lt1"/>
+          </a:fontRef>
+        </p:style>
+        <p:txBody>
+          <a:bodyPr anchor="ctr"/>
+          <a:lstStyle/>
+          <a:p>
+            <a:pPr algn="ctr">
+              <a:defRPr/>
+            </a:pPr>
+            <a:endParaRPr lang="en-US" sz="2400" dirty="0">
+              <a:solidFill>
+                <a:schemeClr val="tx1"/>
+              </a:solidFill>
+              <a:latin typeface="Arial"/>
+              <a:cs typeface="Arial"/>
+            </a:endParaRPr>
+          </a:p>
+        </p:txBody>
+      </p:sp>
+      <p:sp>
+        <p:nvSpPr>
+          <p:cNvPr id="4" name="TextBox 35"/>
+          <p:cNvSpPr txBox="1">
+            <a:spLocks noChangeArrowheads="1"/>
+          </p:cNvSpPr>
+          <p:nvPr/>
+        </p:nvSpPr>
+        <p:spPr bwMode="auto">
+          <a:xfrm>
+            <a:off x="5147762" y="5856230"/>
+            <a:ext cx="2076449" cy="276999"/>
+          </a:xfrm>
+          <a:prstGeom prst="rect">
+            <a:avLst/>
+          </a:prstGeom>
+          <a:noFill/>
+          <a:ln w="9525">
+            <a:noFill/>
+            <a:miter lim="800000"/>
+            <a:headEnd/>
+            <a:tailEnd/>
+          </a:ln>
+        </p:spPr>
+        <p:txBody>
+          <a:bodyPr>
+            <a:spAutoFit/>
+          </a:bodyPr>
+          <a:lstStyle/>
+          <a:p>
+            <a:pPr algn="ctr"/>
+            <a:r>
+              <a:rPr lang="en-US" sz="1200" b="1" dirty="0">
+                <a:latin typeface="+mj-lt"/>
+                <a:ea typeface="Verdana" pitchFamily="34" charset="0"/>
+                <a:cs typeface="Helvetica Neue"/>
+              </a:rPr>
+              <a:t>Virtual Private Cloud</a:t>
+            </a:r>
+            <a:endParaRPr lang="en-US" sz="1200" b="1" dirty="0">
+              <a:latin typeface="+mj-lt"/>
+              <a:ea typeface="Verdana" pitchFamily="34" charset="0"/>
+              <a:cs typeface="Helvetica Neue"/>
+            </a:endParaRPr>
+          </a:p>
+        </p:txBody>
+      </p:sp>
+      <p:sp>
+        <p:nvSpPr>
+          <p:cNvPr id="5" name="TextBox 4"/>
+          <p:cNvSpPr txBox="1">
+            <a:spLocks noChangeArrowheads="1"/>
+          </p:cNvSpPr>
+          <p:nvPr/>
+        </p:nvSpPr>
+        <p:spPr bwMode="auto">
+          <a:xfrm>
+            <a:off x="5212698" y="6406175"/>
+            <a:ext cx="2076449" cy="276999"/>
+          </a:xfrm>
+          <a:prstGeom prst="rect">
+            <a:avLst/>
+          </a:prstGeom>
+          <a:noFill/>
+          <a:ln w="9525">
+            <a:noFill/>
+            <a:miter lim="800000"/>
+            <a:headEnd/>
+            <a:tailEnd/>
+          </a:ln>
+        </p:spPr>
+        <p:txBody>
+          <a:bodyPr>
+            <a:spAutoFit/>
+          </a:bodyPr>
+          <a:lstStyle/>
+          <a:p>
+            <a:pPr algn="ctr"/>
+            <a:r>
+              <a:rPr lang="en-US" sz="1200" b="1" dirty="0">
+                <a:latin typeface="+mj-lt"/>
+                <a:ea typeface="Verdana" pitchFamily="34" charset="0"/>
+                <a:cs typeface="Helvetica Neue"/>
+              </a:rPr>
+              <a:t>AWS Cloud</a:t>
+            </a:r>
+            <a:endParaRPr lang="en-US" sz="1200" b="1" dirty="0">
+              <a:latin typeface="+mj-lt"/>
+              <a:ea typeface="Verdana" pitchFamily="34" charset="0"/>
+              <a:cs typeface="Helvetica Neue"/>
+            </a:endParaRPr>
+          </a:p>
+        </p:txBody>
+      </p:sp>
+      <p:pic>
+        <p:nvPicPr>
+          <p:cNvPr id="6" name="Picture 5"/>
+          <p:cNvPicPr>
+            <a:picLocks noChangeAspect="1"/>
+          </p:cNvPicPr>
+          <p:nvPr/>
+        </p:nvPicPr>
+        <p:blipFill>
+          <a:blip r:embed="rId3">
+            <a:extLst>
+              <a:ext uri="{28A0092B-C50C-407E-A947-70E740481C1C}">
+                <a14:useLocalDpi xmlns:a14="http://schemas.microsoft.com/office/drawing/2010/main" val="0"/>
+              </a:ext>
+            </a:extLst>
+          </a:blip>
+          <a:stretch>
+            <a:fillRect/>
+          </a:stretch>
+        </p:blipFill>
+        <p:spPr>
+          <a:xfrm>
+            <a:off x="3948169" y="2002666"/>
+            <a:ext cx="798895" cy="521500"/>
+          </a:xfrm>
+          <a:prstGeom prst="rect">
+            <a:avLst/>
+          </a:prstGeom>
+        </p:spPr>
+      </p:pic>
+      <p:pic>
+        <p:nvPicPr>
+          <p:cNvPr id="7" name="Picture 6"/>
+          <p:cNvPicPr>
+            <a:picLocks noChangeAspect="1"/>
+          </p:cNvPicPr>
+          <p:nvPr/>
+        </p:nvPicPr>
+        <p:blipFill>
+          <a:blip r:embed="rId4">
+            <a:extLst>
+              <a:ext uri="{28A0092B-C50C-407E-A947-70E740481C1C}">
+                <a14:useLocalDpi xmlns:a14="http://schemas.microsoft.com/office/drawing/2010/main" val="0"/>
+              </a:ext>
+            </a:extLst>
+          </a:blip>
+          <a:stretch>
+            <a:fillRect/>
+          </a:stretch>
+        </p:blipFill>
+        <p:spPr>
+          <a:xfrm>
+            <a:off x="3620739" y="1316023"/>
+            <a:ext cx="804672" cy="525272"/>
+          </a:xfrm>
+          <a:prstGeom prst="rect">
+            <a:avLst/>
+          </a:prstGeom>
+        </p:spPr>
+      </p:pic>
+      <p:sp>
+        <p:nvSpPr>
+          <p:cNvPr id="8" name="Rounded Rectangle 7"/>
+          <p:cNvSpPr/>
+          <p:nvPr/>
+        </p:nvSpPr>
+        <p:spPr>
+          <a:xfrm>
+            <a:off x="3912556" y="3112927"/>
+            <a:ext cx="2336800" cy="2311400"/>
+          </a:xfrm>
+          <a:prstGeom prst="roundRect">
+            <a:avLst>
+              <a:gd name="adj" fmla="val 9818"/>
+            </a:avLst>
+          </a:prstGeom>
+          <a:noFill/>
+          <a:ln w="6350">
+            <a:solidFill>
+              <a:schemeClr val="tx1"/>
+            </a:solidFill>
+            <a:prstDash val="solid"/>
+          </a:ln>
+          <a:effectLst/>
+        </p:spPr>
+        <p:style>
+          <a:lnRef idx="1">
+            <a:schemeClr val="accent1"/>
+          </a:lnRef>
+          <a:fillRef idx="3">
+            <a:schemeClr val="accent1"/>
+          </a:fillRef>
+          <a:effectRef idx="2">
+            <a:schemeClr val="accent1"/>
+          </a:effectRef>
+          <a:fontRef idx="minor">
+            <a:schemeClr val="lt1"/>
+          </a:fontRef>
+        </p:style>
+        <p:txBody>
+          <a:bodyPr anchor="ctr"/>
+          <a:lstStyle/>
+          <a:p>
+            <a:pPr algn="ctr">
+              <a:defRPr/>
+            </a:pPr>
+            <a:endParaRPr lang="en-US" sz="2400" dirty="0">
+              <a:solidFill>
+                <a:schemeClr val="tx1"/>
+              </a:solidFill>
+              <a:latin typeface="Helvetica Neue"/>
+              <a:cs typeface="Helvetica Neue"/>
+            </a:endParaRPr>
+          </a:p>
+        </p:txBody>
+      </p:sp>
+      <p:sp>
+        <p:nvSpPr>
+          <p:cNvPr id="9" name="TextBox 37"/>
+          <p:cNvSpPr txBox="1">
+            <a:spLocks noChangeArrowheads="1"/>
+          </p:cNvSpPr>
+          <p:nvPr/>
+        </p:nvSpPr>
+        <p:spPr bwMode="auto">
+          <a:xfrm>
+            <a:off x="4035323" y="5089894"/>
+            <a:ext cx="2074333" cy="276999"/>
+          </a:xfrm>
+          <a:prstGeom prst="rect">
+            <a:avLst/>
+          </a:prstGeom>
+          <a:noFill/>
+          <a:ln w="9525">
+            <a:noFill/>
+            <a:miter lim="800000"/>
+            <a:headEnd/>
+            <a:tailEnd/>
+          </a:ln>
+        </p:spPr>
+        <p:txBody>
+          <a:bodyPr>
+            <a:spAutoFit/>
+          </a:bodyPr>
+          <a:lstStyle/>
+          <a:p>
+            <a:pPr algn="ctr"/>
+            <a:r>
+              <a:rPr lang="en-US" sz="1200" b="1" dirty="0">
+                <a:latin typeface="+mj-lt"/>
+                <a:ea typeface="Verdana" pitchFamily="34" charset="0"/>
+                <a:cs typeface="Helvetica Neue"/>
+              </a:rPr>
+              <a:t>VPC </a:t>
+            </a:r>
+            <a:r>
+              <a:rPr lang="en-US" sz="1200" b="1" dirty="0">
+                <a:latin typeface="+mj-lt"/>
+                <a:ea typeface="Verdana" pitchFamily="34" charset="0"/>
+                <a:cs typeface="Helvetica Neue"/>
+              </a:rPr>
+              <a:t>Public subnet</a:t>
+            </a:r>
+            <a:endParaRPr lang="en-US" sz="1200" b="1" dirty="0">
+              <a:latin typeface="+mj-lt"/>
+              <a:ea typeface="Verdana" pitchFamily="34" charset="0"/>
+              <a:cs typeface="Helvetica Neue"/>
+            </a:endParaRPr>
+          </a:p>
+        </p:txBody>
+      </p:sp>
+      <p:pic>
+        <p:nvPicPr>
+          <p:cNvPr id="10" name="Picture 9"/>
+          <p:cNvPicPr>
+            <a:picLocks noChangeAspect="1"/>
+          </p:cNvPicPr>
+          <p:nvPr/>
+        </p:nvPicPr>
+        <p:blipFill>
+          <a:blip r:embed="rId5"/>
+          <a:stretch>
+            <a:fillRect/>
+          </a:stretch>
+        </p:blipFill>
+        <p:spPr>
+          <a:xfrm>
+            <a:off x="4151740" y="2896404"/>
+            <a:ext cx="287867" cy="321733"/>
+          </a:xfrm>
+          <a:prstGeom prst="rect">
+            <a:avLst/>
+          </a:prstGeom>
+        </p:spPr>
+      </p:pic>
+      <p:sp>
+        <p:nvSpPr>
+          <p:cNvPr id="11" name="Rounded Rectangle 10"/>
+          <p:cNvSpPr/>
+          <p:nvPr/>
+        </p:nvSpPr>
+        <p:spPr>
+          <a:xfrm>
+            <a:off x="6353073" y="3056959"/>
+            <a:ext cx="2336800" cy="2311400"/>
+          </a:xfrm>
+          <a:prstGeom prst="roundRect">
+            <a:avLst>
+              <a:gd name="adj" fmla="val 9818"/>
+            </a:avLst>
+          </a:prstGeom>
+          <a:noFill/>
+          <a:ln w="6350">
+            <a:solidFill>
+              <a:schemeClr val="tx1"/>
+            </a:solidFill>
+            <a:prstDash val="solid"/>
+          </a:ln>
+          <a:effectLst/>
+        </p:spPr>
+        <p:style>
+          <a:lnRef idx="1">
+            <a:schemeClr val="accent1"/>
+          </a:lnRef>
+          <a:fillRef idx="3">
+            <a:schemeClr val="accent1"/>
+          </a:fillRef>
+          <a:effectRef idx="2">
+            <a:schemeClr val="accent1"/>
+          </a:effectRef>
+          <a:fontRef idx="minor">
+            <a:schemeClr val="lt1"/>
+          </a:fontRef>
+        </p:style>
+        <p:txBody>
+          <a:bodyPr anchor="ctr"/>
+          <a:lstStyle/>
+          <a:p>
+            <a:pPr algn="ctr">
+              <a:defRPr/>
+            </a:pPr>
+            <a:endParaRPr lang="en-US" sz="2400" dirty="0">
+              <a:solidFill>
+                <a:schemeClr val="tx1"/>
+              </a:solidFill>
+              <a:latin typeface="Helvetica Neue"/>
+              <a:cs typeface="Helvetica Neue"/>
+            </a:endParaRPr>
+          </a:p>
+        </p:txBody>
+      </p:sp>
+      <p:sp>
+        <p:nvSpPr>
+          <p:cNvPr id="12" name="TextBox 37"/>
+          <p:cNvSpPr txBox="1">
+            <a:spLocks noChangeArrowheads="1"/>
+          </p:cNvSpPr>
+          <p:nvPr/>
+        </p:nvSpPr>
+        <p:spPr bwMode="auto">
+          <a:xfrm>
+            <a:off x="6475840" y="5033926"/>
+            <a:ext cx="2074333" cy="276999"/>
+          </a:xfrm>
+          <a:prstGeom prst="rect">
+            <a:avLst/>
+          </a:prstGeom>
+          <a:noFill/>
+          <a:ln w="9525">
+            <a:noFill/>
+            <a:miter lim="800000"/>
+            <a:headEnd/>
+            <a:tailEnd/>
+          </a:ln>
+        </p:spPr>
+        <p:txBody>
+          <a:bodyPr>
+            <a:spAutoFit/>
+          </a:bodyPr>
+          <a:lstStyle/>
+          <a:p>
+            <a:pPr algn="ctr"/>
+            <a:r>
+              <a:rPr lang="en-US" sz="1200" b="1" dirty="0">
+                <a:latin typeface="+mj-lt"/>
+                <a:ea typeface="Verdana" pitchFamily="34" charset="0"/>
+                <a:cs typeface="Helvetica Neue"/>
+              </a:rPr>
+              <a:t>VPC </a:t>
+            </a:r>
+            <a:r>
+              <a:rPr lang="en-US" sz="1200" b="1" dirty="0">
+                <a:latin typeface="+mj-lt"/>
+                <a:ea typeface="Verdana" pitchFamily="34" charset="0"/>
+                <a:cs typeface="Helvetica Neue"/>
+              </a:rPr>
+              <a:t>Private Subnet</a:t>
+            </a:r>
+            <a:endParaRPr lang="en-US" sz="1200" b="1" dirty="0">
+              <a:latin typeface="+mj-lt"/>
+              <a:ea typeface="Verdana" pitchFamily="34" charset="0"/>
+              <a:cs typeface="Helvetica Neue"/>
+            </a:endParaRPr>
+          </a:p>
+        </p:txBody>
+      </p:sp>
+      <p:pic>
+        <p:nvPicPr>
+          <p:cNvPr id="13" name="Picture 12"/>
+          <p:cNvPicPr>
+            <a:picLocks noChangeAspect="1"/>
+          </p:cNvPicPr>
+          <p:nvPr/>
+        </p:nvPicPr>
+        <p:blipFill>
+          <a:blip r:embed="rId5"/>
+          <a:stretch>
+            <a:fillRect/>
+          </a:stretch>
+        </p:blipFill>
+        <p:spPr>
+          <a:xfrm>
+            <a:off x="6592257" y="2840436"/>
+            <a:ext cx="287867" cy="321733"/>
+          </a:xfrm>
+          <a:prstGeom prst="rect">
+            <a:avLst/>
+          </a:prstGeom>
+        </p:spPr>
+      </p:pic>
+      <p:pic>
+        <p:nvPicPr>
+          <p:cNvPr id="17" name="Picture 16" descr="Client.png"/>
+          <p:cNvPicPr>
+            <a:picLocks noChangeAspect="1"/>
+          </p:cNvPicPr>
+          <p:nvPr/>
+        </p:nvPicPr>
+        <p:blipFill>
+          <a:blip r:embed="rId6">
+            <a:extLst>
+              <a:ext uri="{28A0092B-C50C-407E-A947-70E740481C1C}">
+                <a14:useLocalDpi xmlns:a14="http://schemas.microsoft.com/office/drawing/2010/main" val="0"/>
+              </a:ext>
+            </a:extLst>
+          </a:blip>
+          <a:stretch>
+            <a:fillRect/>
+          </a:stretch>
+        </p:blipFill>
+        <p:spPr>
+          <a:xfrm>
+            <a:off x="244317" y="3525641"/>
+            <a:ext cx="975360" cy="975360"/>
+          </a:xfrm>
+          <a:prstGeom prst="rect">
+            <a:avLst/>
+          </a:prstGeom>
+        </p:spPr>
+      </p:pic>
+      <p:sp>
+        <p:nvSpPr>
+          <p:cNvPr id="19" name="TextBox 18"/>
+          <p:cNvSpPr txBox="1"/>
+          <p:nvPr/>
+        </p:nvSpPr>
+        <p:spPr>
+          <a:xfrm>
+            <a:off x="1767205" y="4611501"/>
+            <a:ext cx="1438656" cy="207264"/>
+          </a:xfrm>
+          <a:prstGeom prst="rect">
+            <a:avLst/>
+          </a:prstGeom>
+          <a:noFill/>
+        </p:spPr>
+        <p:txBody>
+          <a:bodyPr wrap="square" lIns="0" tIns="0" rIns="0" bIns="0" rtlCol="0">
+            <a:noAutofit/>
+          </a:bodyPr>
+          <a:lstStyle/>
+          <a:p>
+            <a:pPr algn="ctr"/>
+            <a:r>
+              <a:rPr lang="en-US" sz="1200" dirty="0">
+                <a:cs typeface="Helvetica Neue"/>
+              </a:rPr>
+              <a:t>Internet</a:t>
+            </a:r>
+            <a:endParaRPr lang="en-US" sz="1200" dirty="0">
+              <a:cs typeface="Helvetica Neue"/>
+            </a:endParaRPr>
+          </a:p>
+        </p:txBody>
+      </p:sp>
+      <p:sp>
+        <p:nvSpPr>
+          <p:cNvPr id="20" name="TextBox 19"/>
+          <p:cNvSpPr txBox="1"/>
+          <p:nvPr/>
+        </p:nvSpPr>
+        <p:spPr>
+          <a:xfrm>
+            <a:off x="0" y="4611501"/>
+            <a:ext cx="1438656" cy="207264"/>
+          </a:xfrm>
+          <a:prstGeom prst="rect">
+            <a:avLst/>
+          </a:prstGeom>
+          <a:noFill/>
+        </p:spPr>
+        <p:txBody>
+          <a:bodyPr wrap="square" lIns="0" tIns="0" rIns="0" bIns="0" rtlCol="0">
+            <a:noAutofit/>
+          </a:bodyPr>
+          <a:lstStyle/>
+          <a:p>
+            <a:pPr algn="ctr"/>
+            <a:r>
+              <a:rPr lang="en-US" sz="1200" dirty="0">
+                <a:cs typeface="Helvetica Neue"/>
+              </a:rPr>
+              <a:t>client</a:t>
+            </a:r>
+            <a:endParaRPr lang="en-US" sz="1200" dirty="0">
+              <a:cs typeface="Helvetica Neue"/>
+            </a:endParaRPr>
+          </a:p>
+        </p:txBody>
+      </p:sp>
+      <p:sp>
+        <p:nvSpPr>
+          <p:cNvPr id="21" name="TextBox 20"/>
+          <p:cNvSpPr txBox="1"/>
+          <p:nvPr/>
+        </p:nvSpPr>
+        <p:spPr>
+          <a:xfrm>
+            <a:off x="7021700" y="4532253"/>
+            <a:ext cx="853440" cy="365760"/>
+          </a:xfrm>
+          <a:prstGeom prst="rect">
+            <a:avLst/>
+          </a:prstGeom>
+          <a:noFill/>
+        </p:spPr>
+        <p:txBody>
+          <a:bodyPr wrap="square" lIns="0" tIns="0" rIns="0" bIns="0" rtlCol="0" anchor="t">
+            <a:noAutofit/>
+          </a:bodyPr>
+          <a:lstStyle/>
+          <a:p>
+            <a:pPr algn="ctr"/>
+            <a:r>
+              <a:rPr lang="en-US" sz="1200" b="1" dirty="0"/>
+              <a:t>Spinnaker</a:t>
+            </a:r>
+            <a:endParaRPr lang="en-US" sz="1200" b="1" dirty="0"/>
+          </a:p>
+        </p:txBody>
+      </p:sp>
+      <p:pic>
+        <p:nvPicPr>
+          <p:cNvPr id="22" name="Picture 21"/>
+          <p:cNvPicPr>
+            <a:picLocks noChangeAspect="1"/>
+          </p:cNvPicPr>
+          <p:nvPr/>
+        </p:nvPicPr>
+        <p:blipFill>
+          <a:blip r:embed="rId7">
+            <a:extLst>
+              <a:ext uri="{28A0092B-C50C-407E-A947-70E740481C1C}">
+                <a14:useLocalDpi xmlns:a14="http://schemas.microsoft.com/office/drawing/2010/main" val="0"/>
+              </a:ext>
+            </a:extLst>
+          </a:blip>
+          <a:stretch>
+            <a:fillRect/>
+          </a:stretch>
+        </p:blipFill>
+        <p:spPr>
+          <a:xfrm>
+            <a:off x="7098768" y="3636683"/>
+            <a:ext cx="726376" cy="753279"/>
+          </a:xfrm>
+          <a:prstGeom prst="rect">
+            <a:avLst/>
+          </a:prstGeom>
+        </p:spPr>
+      </p:pic>
+      <p:sp>
+        <p:nvSpPr>
+          <p:cNvPr id="23" name="TextBox 22"/>
+          <p:cNvSpPr txBox="1"/>
+          <p:nvPr/>
+        </p:nvSpPr>
+        <p:spPr>
+          <a:xfrm>
+            <a:off x="4497276" y="4566525"/>
+            <a:ext cx="1041064" cy="331488"/>
+          </a:xfrm>
+          <a:prstGeom prst="rect">
+            <a:avLst/>
+          </a:prstGeom>
+          <a:noFill/>
+        </p:spPr>
+        <p:txBody>
+          <a:bodyPr wrap="square" lIns="0" tIns="0" rIns="0" bIns="0" rtlCol="0" anchor="t">
+            <a:noAutofit/>
+          </a:bodyPr>
+          <a:lstStyle/>
+          <a:p>
+            <a:pPr algn="ctr"/>
+            <a:r>
+              <a:rPr lang="en-US" sz="1200" b="1" dirty="0"/>
+              <a:t>Bastion Host</a:t>
+            </a:r>
+            <a:endParaRPr lang="en-US" sz="1200" b="1" dirty="0"/>
+          </a:p>
+        </p:txBody>
+      </p:sp>
+      <p:pic>
+        <p:nvPicPr>
+          <p:cNvPr id="24" name="Picture 23"/>
+          <p:cNvPicPr>
+            <a:picLocks noChangeAspect="1"/>
+          </p:cNvPicPr>
+          <p:nvPr/>
+        </p:nvPicPr>
+        <p:blipFill>
+          <a:blip r:embed="rId7">
+            <a:extLst>
+              <a:ext uri="{28A0092B-C50C-407E-A947-70E740481C1C}">
+                <a14:useLocalDpi xmlns:a14="http://schemas.microsoft.com/office/drawing/2010/main" val="0"/>
+              </a:ext>
+            </a:extLst>
+          </a:blip>
+          <a:stretch>
+            <a:fillRect/>
+          </a:stretch>
+        </p:blipFill>
+        <p:spPr>
+          <a:xfrm>
+            <a:off x="4574344" y="3636683"/>
+            <a:ext cx="726376" cy="753279"/>
+          </a:xfrm>
+          <a:prstGeom prst="rect">
+            <a:avLst/>
+          </a:prstGeom>
+        </p:spPr>
+      </p:pic>
+      <p:cxnSp>
+        <p:nvCxnSpPr>
+          <p:cNvPr id="26" name="Straight Arrow Connector 25"/>
+          <p:cNvCxnSpPr>
+            <a:stCxn id="17" idx="3"/>
+            <a:endCxn id="24" idx="1"/>
+          </p:cNvCxnSpPr>
+          <p:nvPr/>
+        </p:nvCxnSpPr>
+        <p:spPr>
+          <a:xfrm>
+            <a:off x="1219677" y="4013322"/>
+            <a:ext cx="3354667" cy="1"/>
+          </a:xfrm>
+          <a:prstGeom prst="straightConnector1">
+            <a:avLst/>
+          </a:prstGeom>
+          <a:ln>
+            <a:tailEnd type="triangle"/>
+          </a:ln>
+        </p:spPr>
+        <p:style>
+          <a:lnRef idx="2">
+            <a:schemeClr val="accent1"/>
+          </a:lnRef>
+          <a:fillRef idx="0">
+            <a:schemeClr val="accent1"/>
+          </a:fillRef>
+          <a:effectRef idx="1">
+            <a:schemeClr val="accent1"/>
+          </a:effectRef>
+          <a:fontRef idx="minor">
+            <a:schemeClr val="tx1"/>
+          </a:fontRef>
+        </p:style>
+      </p:cxnSp>
+      <p:pic>
+        <p:nvPicPr>
+          <p:cNvPr id="18" name="Picture 17" descr="Internet.png"/>
+          <p:cNvPicPr>
+            <a:picLocks noChangeAspect="1"/>
+          </p:cNvPicPr>
+          <p:nvPr/>
+        </p:nvPicPr>
+        <p:blipFill>
+          <a:blip r:embed="rId8">
+            <a:extLst>
+              <a:ext uri="{28A0092B-C50C-407E-A947-70E740481C1C}">
+                <a14:useLocalDpi xmlns:a14="http://schemas.microsoft.com/office/drawing/2010/main" val="0"/>
+              </a:ext>
+            </a:extLst>
+          </a:blip>
+          <a:stretch>
+            <a:fillRect/>
+          </a:stretch>
+        </p:blipFill>
+        <p:spPr>
+          <a:xfrm>
+            <a:off x="1985559" y="3525641"/>
+            <a:ext cx="975360" cy="975360"/>
+          </a:xfrm>
+          <a:prstGeom prst="rect">
+            <a:avLst/>
+          </a:prstGeom>
+        </p:spPr>
+      </p:pic>
+    </p:spTree>
+    <p:extLst>
+      <p:ext uri="{BB962C8B-B14F-4D97-AF65-F5344CB8AC3E}">
+        <p14:creationId xmlns:p14="http://schemas.microsoft.com/office/powerpoint/2010/main" val="707364941"/>
+      </p:ext>
+    </p:extLst>
+  </p:cSld>
+  <p:clrMapOvr>
+    <a:masterClrMapping/>
+  </p:clrMapOvr>
+</p:sld>
+</file>
+
 <file path=ppt/theme/theme1.xml><?xml version="1.0" encoding="utf-8"?>
 <a:theme xmlns:a="http://schemas.openxmlformats.org/drawingml/2006/main" name="Office Theme">
   <a:themeElements>
@@ -6325,4 +7658,265 @@
     </a:ext>
   </a:extLst>
 </a:theme>
+</file>
+
+<file path=ppt/theme/theme2.xml><?xml version="1.0" encoding="utf-8"?>
+<a:theme xmlns:a="http://schemas.openxmlformats.org/drawingml/2006/main" name="Office Theme">
+  <a:themeElements>
+    <a:clrScheme name="Office">
+      <a:dk1>
+        <a:sysClr val="windowText" lastClr="000000"/>
+      </a:dk1>
+      <a:lt1>
+        <a:sysClr val="window" lastClr="FFFFFF"/>
+      </a:lt1>
+      <a:dk2>
+        <a:srgbClr val="44546A"/>
+      </a:dk2>
+      <a:lt2>
+        <a:srgbClr val="E7E6E6"/>
+      </a:lt2>
+      <a:accent1>
+        <a:srgbClr val="5B9BD5"/>
+      </a:accent1>
+      <a:accent2>
+        <a:srgbClr val="ED7D31"/>
+      </a:accent2>
+      <a:accent3>
+        <a:srgbClr val="A5A5A5"/>
+      </a:accent3>
+      <a:accent4>
+        <a:srgbClr val="FFC000"/>
+      </a:accent4>
+      <a:accent5>
+        <a:srgbClr val="4472C4"/>
+      </a:accent5>
+      <a:accent6>
+        <a:srgbClr val="70AD47"/>
+      </a:accent6>
+      <a:hlink>
+        <a:srgbClr val="0563C1"/>
+      </a:hlink>
+      <a:folHlink>
+        <a:srgbClr val="954F72"/>
+      </a:folHlink>
+    </a:clrScheme>
+    <a:fontScheme name="Office">
+      <a:majorFont>
+        <a:latin typeface="Calibri Light" panose="020F0302020204030204"/>
+        <a:ea typeface=""/>
+        <a:cs typeface=""/>
+        <a:font script="Jpan" typeface="Yu Gothic Light"/>
+        <a:font script="Hang" typeface="맑은 고딕"/>
+        <a:font script="Hans" typeface="DengXian Light"/>
+        <a:font script="Hant" typeface="新細明體"/>
+        <a:font script="Arab" typeface="Times New Roman"/>
+        <a:font script="Hebr" typeface="Times New Roman"/>
+        <a:font script="Thai" typeface="Angsana New"/>
+        <a:font script="Ethi" typeface="Nyala"/>
+        <a:font script="Beng" typeface="Vrinda"/>
+        <a:font script="Gujr" typeface="Shruti"/>
+        <a:font script="Khmr" typeface="MoolBoran"/>
+        <a:font script="Knda" typeface="Tunga"/>
+        <a:font script="Guru" typeface="Raavi"/>
+        <a:font script="Cans" typeface="Euphemia"/>
+        <a:font script="Cher" typeface="Plantagenet Cherokee"/>
+        <a:font script="Yiii" typeface="Microsoft Yi Baiti"/>
+        <a:font script="Tibt" typeface="Microsoft Himalaya"/>
+        <a:font script="Thaa" typeface="MV Boli"/>
+        <a:font script="Deva" typeface="Mangal"/>
+        <a:font script="Telu" typeface="Gautami"/>
+        <a:font script="Taml" typeface="Latha"/>
+        <a:font script="Syrc" typeface="Estrangelo Edessa"/>
+        <a:font script="Orya" typeface="Kalinga"/>
+        <a:font script="Mlym" typeface="Kartika"/>
+        <a:font script="Laoo" typeface="DokChampa"/>
+        <a:font script="Sinh" typeface="Iskoola Pota"/>
+        <a:font script="Mong" typeface="Mongolian Baiti"/>
+        <a:font script="Viet" typeface="Times New Roman"/>
+        <a:font script="Uigh" typeface="Microsoft Uighur"/>
+        <a:font script="Geor" typeface="Sylfaen"/>
+      </a:majorFont>
+      <a:minorFont>
+        <a:latin typeface="Calibri" panose="020F0502020204030204"/>
+        <a:ea typeface=""/>
+        <a:cs typeface=""/>
+        <a:font script="Jpan" typeface="Yu Gothic"/>
+        <a:font script="Hang" typeface="맑은 고딕"/>
+        <a:font script="Hans" typeface="DengXian"/>
+        <a:font script="Hant" typeface="新細明體"/>
+        <a:font script="Arab" typeface="Arial"/>
+        <a:font script="Hebr" typeface="Arial"/>
+        <a:font script="Thai" typeface="Cordia New"/>
+        <a:font script="Ethi" typeface="Nyala"/>
+        <a:font script="Beng" typeface="Vrinda"/>
+        <a:font script="Gujr" typeface="Shruti"/>
+        <a:font script="Khmr" typeface="DaunPenh"/>
+        <a:font script="Knda" typeface="Tunga"/>
+        <a:font script="Guru" typeface="Raavi"/>
+        <a:font script="Cans" typeface="Euphemia"/>
+        <a:font script="Cher" typeface="Plantagenet Cherokee"/>
+        <a:font script="Yiii" typeface="Microsoft Yi Baiti"/>
+        <a:font script="Tibt" typeface="Microsoft Himalaya"/>
+        <a:font script="Thaa" typeface="MV Boli"/>
+        <a:font script="Deva" typeface="Mangal"/>
+        <a:font script="Telu" typeface="Gautami"/>
+        <a:font script="Taml" typeface="Latha"/>
+        <a:font script="Syrc" typeface="Estrangelo Edessa"/>
+        <a:font script="Orya" typeface="Kalinga"/>
+        <a:font script="Mlym" typeface="Kartika"/>
+        <a:font script="Laoo" typeface="DokChampa"/>
+        <a:font script="Sinh" typeface="Iskoola Pota"/>
+        <a:font script="Mong" typeface="Mongolian Baiti"/>
+        <a:font script="Viet" typeface="Arial"/>
+        <a:font script="Uigh" typeface="Microsoft Uighur"/>
+        <a:font script="Geor" typeface="Sylfaen"/>
+      </a:minorFont>
+    </a:fontScheme>
+    <a:fmtScheme name="Office">
+      <a:fillStyleLst>
+        <a:solidFill>
+          <a:schemeClr val="phClr"/>
+        </a:solidFill>
+        <a:gradFill rotWithShape="1">
+          <a:gsLst>
+            <a:gs pos="0">
+              <a:schemeClr val="phClr">
+                <a:lumMod val="110000"/>
+                <a:satMod val="105000"/>
+                <a:tint val="67000"/>
+              </a:schemeClr>
+            </a:gs>
+            <a:gs pos="50000">
+              <a:schemeClr val="phClr">
+                <a:lumMod val="105000"/>
+                <a:satMod val="103000"/>
+                <a:tint val="73000"/>
+              </a:schemeClr>
+            </a:gs>
+            <a:gs pos="100000">
+              <a:schemeClr val="phClr">
+                <a:lumMod val="105000"/>
+                <a:satMod val="109000"/>
+                <a:tint val="81000"/>
+              </a:schemeClr>
+            </a:gs>
+          </a:gsLst>
+          <a:lin ang="5400000" scaled="0"/>
+        </a:gradFill>
+        <a:gradFill rotWithShape="1">
+          <a:gsLst>
+            <a:gs pos="0">
+              <a:schemeClr val="phClr">
+                <a:satMod val="103000"/>
+                <a:lumMod val="102000"/>
+                <a:tint val="94000"/>
+              </a:schemeClr>
+            </a:gs>
+            <a:gs pos="50000">
+              <a:schemeClr val="phClr">
+                <a:satMod val="110000"/>
+                <a:lumMod val="100000"/>
+                <a:shade val="100000"/>
+              </a:schemeClr>
+            </a:gs>
+            <a:gs pos="100000">
+              <a:schemeClr val="phClr">
+                <a:lumMod val="99000"/>
+                <a:satMod val="120000"/>
+                <a:shade val="78000"/>
+              </a:schemeClr>
+            </a:gs>
+          </a:gsLst>
+          <a:lin ang="5400000" scaled="0"/>
+        </a:gradFill>
+      </a:fillStyleLst>
+      <a:lnStyleLst>
+        <a:ln w="6350" cap="flat" cmpd="sng" algn="ctr">
+          <a:solidFill>
+            <a:schemeClr val="phClr"/>
+          </a:solidFill>
+          <a:prstDash val="solid"/>
+          <a:miter lim="800000"/>
+        </a:ln>
+        <a:ln w="12700" cap="flat" cmpd="sng" algn="ctr">
+          <a:solidFill>
+            <a:schemeClr val="phClr"/>
+          </a:solidFill>
+          <a:prstDash val="solid"/>
+          <a:miter lim="800000"/>
+        </a:ln>
+        <a:ln w="19050" cap="flat" cmpd="sng" algn="ctr">
+          <a:solidFill>
+            <a:schemeClr val="phClr"/>
+          </a:solidFill>
+          <a:prstDash val="solid"/>
+          <a:miter lim="800000"/>
+        </a:ln>
+      </a:lnStyleLst>
+      <a:effectStyleLst>
+        <a:effectStyle>
+          <a:effectLst/>
+        </a:effectStyle>
+        <a:effectStyle>
+          <a:effectLst/>
+        </a:effectStyle>
+        <a:effectStyle>
+          <a:effectLst>
+            <a:outerShdw blurRad="57150" dist="19050" dir="5400000" algn="ctr" rotWithShape="0">
+              <a:srgbClr val="000000">
+                <a:alpha val="63000"/>
+              </a:srgbClr>
+            </a:outerShdw>
+          </a:effectLst>
+        </a:effectStyle>
+      </a:effectStyleLst>
+      <a:bgFillStyleLst>
+        <a:solidFill>
+          <a:schemeClr val="phClr"/>
+        </a:solidFill>
+        <a:solidFill>
+          <a:schemeClr val="phClr">
+            <a:tint val="95000"/>
+            <a:satMod val="170000"/>
+          </a:schemeClr>
+        </a:solidFill>
+        <a:gradFill rotWithShape="1">
+          <a:gsLst>
+            <a:gs pos="0">
+              <a:schemeClr val="phClr">
+                <a:tint val="93000"/>
+                <a:satMod val="150000"/>
+                <a:shade val="98000"/>
+                <a:lumMod val="102000"/>
+              </a:schemeClr>
+            </a:gs>
+            <a:gs pos="50000">
+              <a:schemeClr val="phClr">
+                <a:tint val="98000"/>
+                <a:satMod val="130000"/>
+                <a:shade val="90000"/>
+                <a:lumMod val="103000"/>
+              </a:schemeClr>
+            </a:gs>
+            <a:gs pos="100000">
+              <a:schemeClr val="phClr">
+                <a:shade val="63000"/>
+                <a:satMod val="120000"/>
+              </a:schemeClr>
+            </a:gs>
+          </a:gsLst>
+          <a:lin ang="5400000" scaled="0"/>
+        </a:gradFill>
+      </a:bgFillStyleLst>
+    </a:fmtScheme>
+  </a:themeElements>
+  <a:objectDefaults/>
+  <a:extraClrSchemeLst/>
+  <a:extLst>
+    <a:ext uri="{05A4C25C-085E-4340-85A3-A5531E510DB2}">
+      <thm15:themeFamily xmlns:thm15="http://schemas.microsoft.com/office/thememl/2012/main" name="Office Theme" id="{62F939B6-93AF-4DB8-9C6B-D6C7DFDC589F}" vid="{4A3C46E8-61CC-4603-A589-7422A47A8E4A}"/>
+    </a:ext>
+  </a:extLst>
+</a:theme>
 </file>
</xml_diff>